<commit_message>
update the result figure
</commit_message>
<xml_diff>
--- a/Project_Presentation.pptx
+++ b/Project_Presentation.pptx
@@ -648,6 +648,94 @@
     <p:extLst>
       <p:ext uri="{BB962C8B-B14F-4D97-AF65-F5344CB8AC3E}">
         <p14:creationId xmlns:p14="http://schemas.microsoft.com/office/powerpoint/2010/main" val="368844592"/>
+      </p:ext>
+    </p:extLst>
+  </p:cSld>
+  <p:clrMapOvr>
+    <a:masterClrMapping/>
+  </p:clrMapOvr>
+</p:notes>
+</file>
+
+<file path=ppt/notesSlides/notesSlide3.xml><?xml version="1.0" encoding="utf-8"?>
+<p:notes xmlns:a="http://schemas.openxmlformats.org/drawingml/2006/main" xmlns:r="http://schemas.openxmlformats.org/officeDocument/2006/relationships" xmlns:p="http://schemas.openxmlformats.org/presentationml/2006/main">
+  <p:cSld>
+    <p:spTree>
+      <p:nvGrpSpPr>
+        <p:cNvPr id="1" name=""/>
+        <p:cNvGrpSpPr/>
+        <p:nvPr/>
+      </p:nvGrpSpPr>
+      <p:grpSpPr>
+        <a:xfrm>
+          <a:off x="0" y="0"/>
+          <a:ext cx="0" cy="0"/>
+          <a:chOff x="0" y="0"/>
+          <a:chExt cx="0" cy="0"/>
+        </a:xfrm>
+      </p:grpSpPr>
+      <p:sp>
+        <p:nvSpPr>
+          <p:cNvPr id="2" name="幻灯片图像占位符 1"/>
+          <p:cNvSpPr>
+            <a:spLocks noGrp="1" noRot="1" noChangeAspect="1"/>
+          </p:cNvSpPr>
+          <p:nvPr>
+            <p:ph type="sldImg"/>
+          </p:nvPr>
+        </p:nvSpPr>
+        <p:spPr/>
+      </p:sp>
+      <p:sp>
+        <p:nvSpPr>
+          <p:cNvPr id="3" name="备注占位符 2"/>
+          <p:cNvSpPr>
+            <a:spLocks noGrp="1"/>
+          </p:cNvSpPr>
+          <p:nvPr>
+            <p:ph type="body" idx="1"/>
+          </p:nvPr>
+        </p:nvSpPr>
+        <p:spPr/>
+        <p:txBody>
+          <a:bodyPr/>
+          <a:lstStyle/>
+          <a:p>
+            <a:r>
+              <a:rPr kumimoji="1" lang="en-US" altLang="zh-CN" dirty="0"/>
+              <a:t>Take out some factors not that important</a:t>
+            </a:r>
+            <a:endParaRPr kumimoji="1" lang="zh-CN" altLang="en-US" dirty="0"/>
+          </a:p>
+        </p:txBody>
+      </p:sp>
+      <p:sp>
+        <p:nvSpPr>
+          <p:cNvPr id="4" name="灯片编号占位符 3"/>
+          <p:cNvSpPr>
+            <a:spLocks noGrp="1"/>
+          </p:cNvSpPr>
+          <p:nvPr>
+            <p:ph type="sldNum" sz="quarter" idx="5"/>
+          </p:nvPr>
+        </p:nvSpPr>
+        <p:spPr/>
+        <p:txBody>
+          <a:bodyPr/>
+          <a:lstStyle/>
+          <a:p>
+            <a:fld id="{96F9DE16-9C2E-3149-BBBA-75D03C31C444}" type="slidenum">
+              <a:rPr kumimoji="1" lang="zh-CN" altLang="en-US" smtClean="0"/>
+              <a:t>11</a:t>
+            </a:fld>
+            <a:endParaRPr kumimoji="1" lang="zh-CN" altLang="en-US"/>
+          </a:p>
+        </p:txBody>
+      </p:sp>
+    </p:spTree>
+    <p:extLst>
+      <p:ext uri="{BB962C8B-B14F-4D97-AF65-F5344CB8AC3E}">
+        <p14:creationId xmlns:p14="http://schemas.microsoft.com/office/powerpoint/2010/main" val="668167856"/>
       </p:ext>
     </p:extLst>
   </p:cSld>
@@ -3986,7 +4074,7 @@
         </p:nvSpPr>
         <p:spPr>
           <a:xfrm>
-            <a:off x="1678705" y="946466"/>
+            <a:off x="1819381" y="946466"/>
             <a:ext cx="8834590" cy="1470025"/>
           </a:xfrm>
           <a:prstGeom prst="rect">
@@ -4382,10 +4470,10 @@
       </p:sp>
       <p:pic>
         <p:nvPicPr>
-          <p:cNvPr id="4" name="图片 3">
-            <a:extLst>
-              <a:ext uri="{FF2B5EF4-FFF2-40B4-BE49-F238E27FC236}">
-                <a16:creationId xmlns:a16="http://schemas.microsoft.com/office/drawing/2014/main" id="{7CDEB0D0-078D-FE51-37F2-310211E716B0}"/>
+          <p:cNvPr id="8" name="图片 7">
+            <a:extLst>
+              <a:ext uri="{FF2B5EF4-FFF2-40B4-BE49-F238E27FC236}">
+                <a16:creationId xmlns:a16="http://schemas.microsoft.com/office/drawing/2014/main" id="{1516B196-828C-CEBA-7E6E-32BA192A9C87}"/>
               </a:ext>
             </a:extLst>
           </p:cNvPr>
@@ -4402,8 +4490,8 @@
         </p:blipFill>
         <p:spPr>
           <a:xfrm>
-            <a:off x="319245" y="2145738"/>
-            <a:ext cx="5621634" cy="4216226"/>
+            <a:off x="5834183" y="2131150"/>
+            <a:ext cx="5621633" cy="4216225"/>
           </a:xfrm>
           <a:prstGeom prst="rect">
             <a:avLst/>
@@ -4412,10 +4500,10 @@
       </p:pic>
       <p:pic>
         <p:nvPicPr>
-          <p:cNvPr id="6" name="图片 5">
-            <a:extLst>
-              <a:ext uri="{FF2B5EF4-FFF2-40B4-BE49-F238E27FC236}">
-                <a16:creationId xmlns:a16="http://schemas.microsoft.com/office/drawing/2014/main" id="{AB2794B7-D6F6-E2C0-5FDA-04F518C98482}"/>
+          <p:cNvPr id="9" name="图片 8">
+            <a:extLst>
+              <a:ext uri="{FF2B5EF4-FFF2-40B4-BE49-F238E27FC236}">
+                <a16:creationId xmlns:a16="http://schemas.microsoft.com/office/drawing/2014/main" id="{A65A81D1-D6F0-9C21-0781-DA658C6CCE21}"/>
               </a:ext>
             </a:extLst>
           </p:cNvPr>
@@ -4432,8 +4520,8 @@
         </p:blipFill>
         <p:spPr>
           <a:xfrm>
-            <a:off x="5952602" y="2163531"/>
-            <a:ext cx="5574185" cy="4180639"/>
+            <a:off x="427476" y="2131150"/>
+            <a:ext cx="5621632" cy="4216224"/>
           </a:xfrm>
           <a:prstGeom prst="rect">
             <a:avLst/>
@@ -4684,7 +4772,7 @@
           <p:nvPr/>
         </p:nvPicPr>
         <p:blipFill>
-          <a:blip r:embed="rId2"/>
+          <a:blip r:embed="rId3"/>
           <a:stretch>
             <a:fillRect/>
           </a:stretch>

</xml_diff>